<commit_message>
cleaned up code & added comments
</commit_message>
<xml_diff>
--- a/lab/Final Presentation.pptx
+++ b/lab/Final Presentation.pptx
@@ -110,6 +110,11 @@
       </a:defRPr>
     </a:lvl9pPr>
   </p:defaultTextStyle>
+  <p:extLst>
+    <p:ext uri="{EFAFB233-063F-42B5-8137-9DF3F51BA10A}">
+      <p15:sldGuideLst xmlns:p15="http://schemas.microsoft.com/office/powerpoint/2012/main"/>
+    </p:ext>
+  </p:extLst>
 </p:presentation>
 </file>
 
@@ -170,7 +175,7 @@
           <a:noFill/>
           <a:extLst>
             <a:ext uri="{909E8E84-426E-40dd-AFC4-6F175D3DCCD1}">
-              <a14:hiddenFill xmlns:a14="http://schemas.microsoft.com/office/drawing/2010/main" xmlns="">
+              <a14:hiddenFill xmlns="" xmlns:a14="http://schemas.microsoft.com/office/drawing/2010/main">
                 <a:solidFill>
                   <a:srgbClr val="FFFFFF"/>
                 </a:solidFill>
@@ -229,7 +234,7 @@
             </a:ln>
             <a:extLst>
               <a:ext uri="{91240B29-F687-4f45-9708-019B960494DF}">
-                <a14:hiddenLine xmlns:a14="http://schemas.microsoft.com/office/drawing/2010/main" xmlns="" w="9525">
+                <a14:hiddenLine xmlns="" xmlns:a14="http://schemas.microsoft.com/office/drawing/2010/main" w="9525">
                   <a:solidFill>
                     <a:srgbClr val="000000"/>
                   </a:solidFill>
@@ -319,7 +324,7 @@
             </a:ln>
             <a:extLst>
               <a:ext uri="{91240B29-F687-4f45-9708-019B960494DF}">
-                <a14:hiddenLine xmlns:a14="http://schemas.microsoft.com/office/drawing/2010/main" xmlns="" w="9525">
+                <a14:hiddenLine xmlns="" xmlns:a14="http://schemas.microsoft.com/office/drawing/2010/main" w="9525">
                   <a:solidFill>
                     <a:srgbClr val="000000"/>
                   </a:solidFill>
@@ -409,7 +414,7 @@
             </a:ln>
             <a:extLst>
               <a:ext uri="{91240B29-F687-4f45-9708-019B960494DF}">
-                <a14:hiddenLine xmlns:a14="http://schemas.microsoft.com/office/drawing/2010/main" xmlns="" w="9525">
+                <a14:hiddenLine xmlns="" xmlns:a14="http://schemas.microsoft.com/office/drawing/2010/main" w="9525">
                   <a:solidFill>
                     <a:srgbClr val="000000"/>
                   </a:solidFill>
@@ -443,7 +448,7 @@
             </a:ln>
             <a:extLst>
               <a:ext uri="{91240B29-F687-4f45-9708-019B960494DF}">
-                <a14:hiddenLine xmlns:a14="http://schemas.microsoft.com/office/drawing/2010/main" xmlns="" w="9525">
+                <a14:hiddenLine xmlns="" xmlns:a14="http://schemas.microsoft.com/office/drawing/2010/main" w="9525">
                   <a:solidFill>
                     <a:srgbClr val="000000"/>
                   </a:solidFill>
@@ -533,7 +538,7 @@
             </a:ln>
             <a:extLst>
               <a:ext uri="{91240B29-F687-4f45-9708-019B960494DF}">
-                <a14:hiddenLine xmlns:a14="http://schemas.microsoft.com/office/drawing/2010/main" xmlns="" w="9525">
+                <a14:hiddenLine xmlns="" xmlns:a14="http://schemas.microsoft.com/office/drawing/2010/main" w="9525">
                   <a:solidFill>
                     <a:srgbClr val="000000"/>
                   </a:solidFill>
@@ -595,7 +600,7 @@
             </a:ln>
             <a:extLst>
               <a:ext uri="{91240B29-F687-4f45-9708-019B960494DF}">
-                <a14:hiddenLine xmlns:a14="http://schemas.microsoft.com/office/drawing/2010/main" xmlns="" w="9525">
+                <a14:hiddenLine xmlns="" xmlns:a14="http://schemas.microsoft.com/office/drawing/2010/main" w="9525">
                   <a:solidFill>
                     <a:srgbClr val="000000"/>
                   </a:solidFill>
@@ -657,7 +662,7 @@
             </a:ln>
             <a:extLst>
               <a:ext uri="{91240B29-F687-4f45-9708-019B960494DF}">
-                <a14:hiddenLine xmlns:a14="http://schemas.microsoft.com/office/drawing/2010/main" xmlns="" w="9525">
+                <a14:hiddenLine xmlns="" xmlns:a14="http://schemas.microsoft.com/office/drawing/2010/main" w="9525">
                   <a:solidFill>
                     <a:srgbClr val="000000"/>
                   </a:solidFill>
@@ -747,7 +752,7 @@
             </a:ln>
             <a:extLst>
               <a:ext uri="{91240B29-F687-4f45-9708-019B960494DF}">
-                <a14:hiddenLine xmlns:a14="http://schemas.microsoft.com/office/drawing/2010/main" xmlns="" w="9525">
+                <a14:hiddenLine xmlns="" xmlns:a14="http://schemas.microsoft.com/office/drawing/2010/main" w="9525">
                   <a:solidFill>
                     <a:srgbClr val="000000"/>
                   </a:solidFill>
@@ -809,7 +814,7 @@
             </a:ln>
             <a:extLst>
               <a:ext uri="{91240B29-F687-4f45-9708-019B960494DF}">
-                <a14:hiddenLine xmlns:a14="http://schemas.microsoft.com/office/drawing/2010/main" xmlns="" w="9525">
+                <a14:hiddenLine xmlns="" xmlns:a14="http://schemas.microsoft.com/office/drawing/2010/main" w="9525">
                   <a:solidFill>
                     <a:srgbClr val="000000"/>
                   </a:solidFill>
@@ -871,7 +876,7 @@
             </a:ln>
             <a:extLst>
               <a:ext uri="{91240B29-F687-4f45-9708-019B960494DF}">
-                <a14:hiddenLine xmlns:a14="http://schemas.microsoft.com/office/drawing/2010/main" xmlns="" w="9525">
+                <a14:hiddenLine xmlns="" xmlns:a14="http://schemas.microsoft.com/office/drawing/2010/main" w="9525">
                   <a:solidFill>
                     <a:srgbClr val="000000"/>
                   </a:solidFill>
@@ -961,7 +966,7 @@
             </a:ln>
             <a:extLst>
               <a:ext uri="{91240B29-F687-4f45-9708-019B960494DF}">
-                <a14:hiddenLine xmlns:a14="http://schemas.microsoft.com/office/drawing/2010/main" xmlns="" w="9525">
+                <a14:hiddenLine xmlns="" xmlns:a14="http://schemas.microsoft.com/office/drawing/2010/main" w="9525">
                   <a:solidFill>
                     <a:srgbClr val="000000"/>
                   </a:solidFill>
@@ -1051,7 +1056,7 @@
             </a:ln>
             <a:extLst>
               <a:ext uri="{91240B29-F687-4f45-9708-019B960494DF}">
-                <a14:hiddenLine xmlns:a14="http://schemas.microsoft.com/office/drawing/2010/main" xmlns="" w="9525">
+                <a14:hiddenLine xmlns="" xmlns:a14="http://schemas.microsoft.com/office/drawing/2010/main" w="9525">
                   <a:solidFill>
                     <a:srgbClr val="000000"/>
                   </a:solidFill>
@@ -1113,7 +1118,7 @@
             </a:ln>
             <a:extLst>
               <a:ext uri="{91240B29-F687-4f45-9708-019B960494DF}">
-                <a14:hiddenLine xmlns:a14="http://schemas.microsoft.com/office/drawing/2010/main" xmlns="" w="9525">
+                <a14:hiddenLine xmlns="" xmlns:a14="http://schemas.microsoft.com/office/drawing/2010/main" w="9525">
                   <a:solidFill>
                     <a:srgbClr val="000000"/>
                   </a:solidFill>
@@ -1223,7 +1228,7 @@
             </a:ln>
             <a:extLst>
               <a:ext uri="{91240B29-F687-4f45-9708-019B960494DF}">
-                <a14:hiddenLine xmlns:a14="http://schemas.microsoft.com/office/drawing/2010/main" xmlns="" w="9525">
+                <a14:hiddenLine xmlns="" xmlns:a14="http://schemas.microsoft.com/office/drawing/2010/main" w="9525">
                   <a:solidFill>
                     <a:srgbClr val="000000"/>
                   </a:solidFill>
@@ -1285,7 +1290,7 @@
             </a:ln>
             <a:extLst>
               <a:ext uri="{91240B29-F687-4f45-9708-019B960494DF}">
-                <a14:hiddenLine xmlns:a14="http://schemas.microsoft.com/office/drawing/2010/main" xmlns="" w="9525">
+                <a14:hiddenLine xmlns="" xmlns:a14="http://schemas.microsoft.com/office/drawing/2010/main" w="9525">
                   <a:solidFill>
                     <a:srgbClr val="000000"/>
                   </a:solidFill>
@@ -1375,7 +1380,7 @@
             </a:ln>
             <a:extLst>
               <a:ext uri="{91240B29-F687-4f45-9708-019B960494DF}">
-                <a14:hiddenLine xmlns:a14="http://schemas.microsoft.com/office/drawing/2010/main" xmlns="" w="9525">
+                <a14:hiddenLine xmlns="" xmlns:a14="http://schemas.microsoft.com/office/drawing/2010/main" w="9525">
                   <a:solidFill>
                     <a:srgbClr val="000000"/>
                   </a:solidFill>
@@ -1465,7 +1470,7 @@
             </a:ln>
             <a:extLst>
               <a:ext uri="{91240B29-F687-4f45-9708-019B960494DF}">
-                <a14:hiddenLine xmlns:a14="http://schemas.microsoft.com/office/drawing/2010/main" xmlns="" w="9525">
+                <a14:hiddenLine xmlns="" xmlns:a14="http://schemas.microsoft.com/office/drawing/2010/main" w="9525">
                   <a:solidFill>
                     <a:srgbClr val="000000"/>
                   </a:solidFill>
@@ -1527,7 +1532,7 @@
             </a:ln>
             <a:extLst>
               <a:ext uri="{91240B29-F687-4f45-9708-019B960494DF}">
-                <a14:hiddenLine xmlns:a14="http://schemas.microsoft.com/office/drawing/2010/main" xmlns="" w="9525">
+                <a14:hiddenLine xmlns="" xmlns:a14="http://schemas.microsoft.com/office/drawing/2010/main" w="9525">
                   <a:solidFill>
                     <a:srgbClr val="000000"/>
                   </a:solidFill>
@@ -1617,7 +1622,7 @@
             </a:ln>
             <a:extLst>
               <a:ext uri="{91240B29-F687-4f45-9708-019B960494DF}">
-                <a14:hiddenLine xmlns:a14="http://schemas.microsoft.com/office/drawing/2010/main" xmlns="" w="9525">
+                <a14:hiddenLine xmlns="" xmlns:a14="http://schemas.microsoft.com/office/drawing/2010/main" w="9525">
                   <a:solidFill>
                     <a:srgbClr val="000000"/>
                   </a:solidFill>
@@ -1707,7 +1712,7 @@
             </a:ln>
             <a:extLst>
               <a:ext uri="{91240B29-F687-4f45-9708-019B960494DF}">
-                <a14:hiddenLine xmlns:a14="http://schemas.microsoft.com/office/drawing/2010/main" xmlns="" w="9525">
+                <a14:hiddenLine xmlns="" xmlns:a14="http://schemas.microsoft.com/office/drawing/2010/main" w="9525">
                   <a:solidFill>
                     <a:srgbClr val="000000"/>
                   </a:solidFill>
@@ -1763,7 +1768,7 @@
             </a:ln>
             <a:extLst>
               <a:ext uri="{91240B29-F687-4f45-9708-019B960494DF}">
-                <a14:hiddenLine xmlns:a14="http://schemas.microsoft.com/office/drawing/2010/main" xmlns="" w="9525">
+                <a14:hiddenLine xmlns="" xmlns:a14="http://schemas.microsoft.com/office/drawing/2010/main" w="9525">
                   <a:solidFill>
                     <a:srgbClr val="000000"/>
                   </a:solidFill>
@@ -1853,7 +1858,7 @@
             </a:ln>
             <a:extLst>
               <a:ext uri="{91240B29-F687-4f45-9708-019B960494DF}">
-                <a14:hiddenLine xmlns:a14="http://schemas.microsoft.com/office/drawing/2010/main" xmlns="" w="9525">
+                <a14:hiddenLine xmlns="" xmlns:a14="http://schemas.microsoft.com/office/drawing/2010/main" w="9525">
                   <a:solidFill>
                     <a:srgbClr val="000000"/>
                   </a:solidFill>
@@ -1909,7 +1914,7 @@
             </a:ln>
             <a:extLst>
               <a:ext uri="{91240B29-F687-4f45-9708-019B960494DF}">
-                <a14:hiddenLine xmlns:a14="http://schemas.microsoft.com/office/drawing/2010/main" xmlns="" w="9525">
+                <a14:hiddenLine xmlns="" xmlns:a14="http://schemas.microsoft.com/office/drawing/2010/main" w="9525">
                   <a:solidFill>
                     <a:srgbClr val="000000"/>
                   </a:solidFill>
@@ -1999,7 +2004,7 @@
             </a:ln>
             <a:extLst>
               <a:ext uri="{91240B29-F687-4f45-9708-019B960494DF}">
-                <a14:hiddenLine xmlns:a14="http://schemas.microsoft.com/office/drawing/2010/main" xmlns="" w="9525">
+                <a14:hiddenLine xmlns="" xmlns:a14="http://schemas.microsoft.com/office/drawing/2010/main" w="9525">
                   <a:solidFill>
                     <a:srgbClr val="000000"/>
                   </a:solidFill>
@@ -2067,7 +2072,7 @@
             </a:ln>
             <a:extLst>
               <a:ext uri="{91240B29-F687-4f45-9708-019B960494DF}">
-                <a14:hiddenLine xmlns:a14="http://schemas.microsoft.com/office/drawing/2010/main" xmlns="" w="9525">
+                <a14:hiddenLine xmlns="" xmlns:a14="http://schemas.microsoft.com/office/drawing/2010/main" w="9525">
                   <a:solidFill>
                     <a:srgbClr val="000000"/>
                   </a:solidFill>
@@ -2157,7 +2162,7 @@
             </a:ln>
             <a:extLst>
               <a:ext uri="{91240B29-F687-4f45-9708-019B960494DF}">
-                <a14:hiddenLine xmlns:a14="http://schemas.microsoft.com/office/drawing/2010/main" xmlns="" w="9525">
+                <a14:hiddenLine xmlns="" xmlns:a14="http://schemas.microsoft.com/office/drawing/2010/main" w="9525">
                   <a:solidFill>
                     <a:srgbClr val="000000"/>
                   </a:solidFill>
@@ -2225,7 +2230,7 @@
             </a:ln>
             <a:extLst>
               <a:ext uri="{91240B29-F687-4f45-9708-019B960494DF}">
-                <a14:hiddenLine xmlns:a14="http://schemas.microsoft.com/office/drawing/2010/main" xmlns="" w="9525">
+                <a14:hiddenLine xmlns="" xmlns:a14="http://schemas.microsoft.com/office/drawing/2010/main" w="9525">
                   <a:solidFill>
                     <a:srgbClr val="000000"/>
                   </a:solidFill>
@@ -2315,7 +2320,7 @@
             </a:ln>
             <a:extLst>
               <a:ext uri="{91240B29-F687-4f45-9708-019B960494DF}">
-                <a14:hiddenLine xmlns:a14="http://schemas.microsoft.com/office/drawing/2010/main" xmlns="" w="9525">
+                <a14:hiddenLine xmlns="" xmlns:a14="http://schemas.microsoft.com/office/drawing/2010/main" w="9525">
                   <a:solidFill>
                     <a:srgbClr val="000000"/>
                   </a:solidFill>
@@ -2349,7 +2354,7 @@
             </a:ln>
             <a:extLst>
               <a:ext uri="{91240B29-F687-4f45-9708-019B960494DF}">
-                <a14:hiddenLine xmlns:a14="http://schemas.microsoft.com/office/drawing/2010/main" xmlns="" w="9525">
+                <a14:hiddenLine xmlns="" xmlns:a14="http://schemas.microsoft.com/office/drawing/2010/main" w="9525">
                   <a:solidFill>
                     <a:srgbClr val="000000"/>
                   </a:solidFill>
@@ -2439,7 +2444,7 @@
             </a:ln>
             <a:extLst>
               <a:ext uri="{91240B29-F687-4f45-9708-019B960494DF}">
-                <a14:hiddenLine xmlns:a14="http://schemas.microsoft.com/office/drawing/2010/main" xmlns="" w="9525">
+                <a14:hiddenLine xmlns="" xmlns:a14="http://schemas.microsoft.com/office/drawing/2010/main" w="9525">
                   <a:solidFill>
                     <a:srgbClr val="000000"/>
                   </a:solidFill>
@@ -2501,7 +2506,7 @@
             </a:ln>
             <a:extLst>
               <a:ext uri="{91240B29-F687-4f45-9708-019B960494DF}">
-                <a14:hiddenLine xmlns:a14="http://schemas.microsoft.com/office/drawing/2010/main" xmlns="" w="9525">
+                <a14:hiddenLine xmlns="" xmlns:a14="http://schemas.microsoft.com/office/drawing/2010/main" w="9525">
                   <a:solidFill>
                     <a:srgbClr val="000000"/>
                   </a:solidFill>
@@ -2563,7 +2568,7 @@
             </a:ln>
             <a:extLst>
               <a:ext uri="{91240B29-F687-4f45-9708-019B960494DF}">
-                <a14:hiddenLine xmlns:a14="http://schemas.microsoft.com/office/drawing/2010/main" xmlns="" w="9525">
+                <a14:hiddenLine xmlns="" xmlns:a14="http://schemas.microsoft.com/office/drawing/2010/main" w="9525">
                   <a:solidFill>
                     <a:srgbClr val="000000"/>
                   </a:solidFill>
@@ -2653,7 +2658,7 @@
             </a:ln>
             <a:extLst>
               <a:ext uri="{91240B29-F687-4f45-9708-019B960494DF}">
-                <a14:hiddenLine xmlns:a14="http://schemas.microsoft.com/office/drawing/2010/main" xmlns="" w="9525">
+                <a14:hiddenLine xmlns="" xmlns:a14="http://schemas.microsoft.com/office/drawing/2010/main" w="9525">
                   <a:solidFill>
                     <a:srgbClr val="000000"/>
                   </a:solidFill>
@@ -2721,7 +2726,7 @@
             </a:ln>
             <a:extLst>
               <a:ext uri="{91240B29-F687-4f45-9708-019B960494DF}">
-                <a14:hiddenLine xmlns:a14="http://schemas.microsoft.com/office/drawing/2010/main" xmlns="" w="9525">
+                <a14:hiddenLine xmlns="" xmlns:a14="http://schemas.microsoft.com/office/drawing/2010/main" w="9525">
                   <a:solidFill>
                     <a:srgbClr val="000000"/>
                   </a:solidFill>
@@ -2783,7 +2788,7 @@
             </a:ln>
             <a:extLst>
               <a:ext uri="{91240B29-F687-4f45-9708-019B960494DF}">
-                <a14:hiddenLine xmlns:a14="http://schemas.microsoft.com/office/drawing/2010/main" xmlns="" w="9525">
+                <a14:hiddenLine xmlns="" xmlns:a14="http://schemas.microsoft.com/office/drawing/2010/main" w="9525">
                   <a:solidFill>
                     <a:srgbClr val="000000"/>
                   </a:solidFill>
@@ -2873,7 +2878,7 @@
             </a:ln>
             <a:extLst>
               <a:ext uri="{91240B29-F687-4f45-9708-019B960494DF}">
-                <a14:hiddenLine xmlns:a14="http://schemas.microsoft.com/office/drawing/2010/main" xmlns="" w="9525">
+                <a14:hiddenLine xmlns="" xmlns:a14="http://schemas.microsoft.com/office/drawing/2010/main" w="9525">
                   <a:solidFill>
                     <a:srgbClr val="000000"/>
                   </a:solidFill>
@@ -2935,7 +2940,7 @@
             </a:ln>
             <a:extLst>
               <a:ext uri="{91240B29-F687-4f45-9708-019B960494DF}">
-                <a14:hiddenLine xmlns:a14="http://schemas.microsoft.com/office/drawing/2010/main" xmlns="" w="9525">
+                <a14:hiddenLine xmlns="" xmlns:a14="http://schemas.microsoft.com/office/drawing/2010/main" w="9525">
                   <a:solidFill>
                     <a:srgbClr val="000000"/>
                   </a:solidFill>
@@ -3025,7 +3030,7 @@
             </a:ln>
             <a:extLst>
               <a:ext uri="{91240B29-F687-4f45-9708-019B960494DF}">
-                <a14:hiddenLine xmlns:a14="http://schemas.microsoft.com/office/drawing/2010/main" xmlns="" w="9525">
+                <a14:hiddenLine xmlns="" xmlns:a14="http://schemas.microsoft.com/office/drawing/2010/main" w="9525">
                   <a:solidFill>
                     <a:srgbClr val="000000"/>
                   </a:solidFill>
@@ -3087,7 +3092,7 @@
             </a:ln>
             <a:extLst>
               <a:ext uri="{91240B29-F687-4f45-9708-019B960494DF}">
-                <a14:hiddenLine xmlns:a14="http://schemas.microsoft.com/office/drawing/2010/main" xmlns="" w="9525">
+                <a14:hiddenLine xmlns="" xmlns:a14="http://schemas.microsoft.com/office/drawing/2010/main" w="9525">
                   <a:solidFill>
                     <a:srgbClr val="000000"/>
                   </a:solidFill>
@@ -3177,7 +3182,7 @@
             </a:ln>
             <a:extLst>
               <a:ext uri="{91240B29-F687-4f45-9708-019B960494DF}">
-                <a14:hiddenLine xmlns:a14="http://schemas.microsoft.com/office/drawing/2010/main" xmlns="" w="9525">
+                <a14:hiddenLine xmlns="" xmlns:a14="http://schemas.microsoft.com/office/drawing/2010/main" w="9525">
                   <a:solidFill>
                     <a:srgbClr val="000000"/>
                   </a:solidFill>
@@ -3211,7 +3216,7 @@
             </a:ln>
             <a:extLst>
               <a:ext uri="{91240B29-F687-4f45-9708-019B960494DF}">
-                <a14:hiddenLine xmlns:a14="http://schemas.microsoft.com/office/drawing/2010/main" xmlns="" w="9525">
+                <a14:hiddenLine xmlns="" xmlns:a14="http://schemas.microsoft.com/office/drawing/2010/main" w="9525">
                   <a:solidFill>
                     <a:srgbClr val="000000"/>
                   </a:solidFill>
@@ -3276,7 +3281,7 @@
             </a:ln>
             <a:extLst>
               <a:ext uri="{91240B29-F687-4f45-9708-019B960494DF}">
-                <a14:hiddenLine xmlns:a14="http://schemas.microsoft.com/office/drawing/2010/main" xmlns="" w="9525">
+                <a14:hiddenLine xmlns="" xmlns:a14="http://schemas.microsoft.com/office/drawing/2010/main" w="9525">
                   <a:solidFill>
                     <a:srgbClr val="000000"/>
                   </a:solidFill>
@@ -3366,7 +3371,7 @@
             </a:ln>
             <a:extLst>
               <a:ext uri="{91240B29-F687-4f45-9708-019B960494DF}">
-                <a14:hiddenLine xmlns:a14="http://schemas.microsoft.com/office/drawing/2010/main" xmlns="" w="9525">
+                <a14:hiddenLine xmlns="" xmlns:a14="http://schemas.microsoft.com/office/drawing/2010/main" w="9525">
                   <a:solidFill>
                     <a:srgbClr val="000000"/>
                   </a:solidFill>
@@ -3428,7 +3433,7 @@
             </a:ln>
             <a:extLst>
               <a:ext uri="{91240B29-F687-4f45-9708-019B960494DF}">
-                <a14:hiddenLine xmlns:a14="http://schemas.microsoft.com/office/drawing/2010/main" xmlns="" w="9525">
+                <a14:hiddenLine xmlns="" xmlns:a14="http://schemas.microsoft.com/office/drawing/2010/main" w="9525">
                   <a:solidFill>
                     <a:srgbClr val="000000"/>
                   </a:solidFill>
@@ -3518,7 +3523,7 @@
             </a:ln>
             <a:extLst>
               <a:ext uri="{91240B29-F687-4f45-9708-019B960494DF}">
-                <a14:hiddenLine xmlns:a14="http://schemas.microsoft.com/office/drawing/2010/main" xmlns="" w="9525">
+                <a14:hiddenLine xmlns="" xmlns:a14="http://schemas.microsoft.com/office/drawing/2010/main" w="9525">
                   <a:solidFill>
                     <a:srgbClr val="000000"/>
                   </a:solidFill>
@@ -3608,7 +3613,7 @@
             </a:ln>
             <a:extLst>
               <a:ext uri="{91240B29-F687-4f45-9708-019B960494DF}">
-                <a14:hiddenLine xmlns:a14="http://schemas.microsoft.com/office/drawing/2010/main" xmlns="" w="9525">
+                <a14:hiddenLine xmlns="" xmlns:a14="http://schemas.microsoft.com/office/drawing/2010/main" w="9525">
                   <a:solidFill>
                     <a:srgbClr val="000000"/>
                   </a:solidFill>
@@ -3673,7 +3678,7 @@
             </a:ln>
             <a:extLst>
               <a:ext uri="{91240B29-F687-4f45-9708-019B960494DF}">
-                <a14:hiddenLine xmlns:a14="http://schemas.microsoft.com/office/drawing/2010/main" xmlns="" w="9525">
+                <a14:hiddenLine xmlns="" xmlns:a14="http://schemas.microsoft.com/office/drawing/2010/main" w="9525">
                   <a:solidFill>
                     <a:srgbClr val="000000"/>
                   </a:solidFill>
@@ -3735,7 +3740,7 @@
             </a:ln>
             <a:extLst>
               <a:ext uri="{91240B29-F687-4f45-9708-019B960494DF}">
-                <a14:hiddenLine xmlns:a14="http://schemas.microsoft.com/office/drawing/2010/main" xmlns="" w="9525">
+                <a14:hiddenLine xmlns="" xmlns:a14="http://schemas.microsoft.com/office/drawing/2010/main" w="9525">
                   <a:solidFill>
                     <a:srgbClr val="000000"/>
                   </a:solidFill>
@@ -3825,7 +3830,7 @@
             </a:ln>
             <a:extLst>
               <a:ext uri="{91240B29-F687-4f45-9708-019B960494DF}">
-                <a14:hiddenLine xmlns:a14="http://schemas.microsoft.com/office/drawing/2010/main" xmlns="" w="9525">
+                <a14:hiddenLine xmlns="" xmlns:a14="http://schemas.microsoft.com/office/drawing/2010/main" w="9525">
                   <a:solidFill>
                     <a:srgbClr val="000000"/>
                   </a:solidFill>
@@ -3915,7 +3920,7 @@
             </a:ln>
             <a:extLst>
               <a:ext uri="{91240B29-F687-4f45-9708-019B960494DF}">
-                <a14:hiddenLine xmlns:a14="http://schemas.microsoft.com/office/drawing/2010/main" xmlns="" w="9525">
+                <a14:hiddenLine xmlns="" xmlns:a14="http://schemas.microsoft.com/office/drawing/2010/main" w="9525">
                   <a:solidFill>
                     <a:srgbClr val="000000"/>
                   </a:solidFill>
@@ -3977,7 +3982,7 @@
             </a:ln>
             <a:extLst>
               <a:ext uri="{91240B29-F687-4f45-9708-019B960494DF}">
-                <a14:hiddenLine xmlns:a14="http://schemas.microsoft.com/office/drawing/2010/main" xmlns="" w="9525">
+                <a14:hiddenLine xmlns="" xmlns:a14="http://schemas.microsoft.com/office/drawing/2010/main" w="9525">
                   <a:solidFill>
                     <a:srgbClr val="000000"/>
                   </a:solidFill>
@@ -4097,7 +4102,7 @@
             </a:ln>
             <a:extLst>
               <a:ext uri="{91240B29-F687-4f45-9708-019B960494DF}">
-                <a14:hiddenLine xmlns:a14="http://schemas.microsoft.com/office/drawing/2010/main" xmlns="" w="9525">
+                <a14:hiddenLine xmlns="" xmlns:a14="http://schemas.microsoft.com/office/drawing/2010/main" w="9525">
                   <a:solidFill>
                     <a:srgbClr val="000000"/>
                   </a:solidFill>
@@ -4165,7 +4170,7 @@
             </a:ln>
             <a:extLst>
               <a:ext uri="{91240B29-F687-4f45-9708-019B960494DF}">
-                <a14:hiddenLine xmlns:a14="http://schemas.microsoft.com/office/drawing/2010/main" xmlns="" w="9525">
+                <a14:hiddenLine xmlns="" xmlns:a14="http://schemas.microsoft.com/office/drawing/2010/main" w="9525">
                   <a:solidFill>
                     <a:srgbClr val="000000"/>
                   </a:solidFill>
@@ -4255,7 +4260,7 @@
             </a:ln>
             <a:extLst>
               <a:ext uri="{91240B29-F687-4f45-9708-019B960494DF}">
-                <a14:hiddenLine xmlns:a14="http://schemas.microsoft.com/office/drawing/2010/main" xmlns="" w="9525">
+                <a14:hiddenLine xmlns="" xmlns:a14="http://schemas.microsoft.com/office/drawing/2010/main" w="9525">
                   <a:solidFill>
                     <a:srgbClr val="000000"/>
                   </a:solidFill>
@@ -9069,7 +9074,7 @@
           <a:noFill/>
           <a:extLst>
             <a:ext uri="{909E8E84-426E-40dd-AFC4-6F175D3DCCD1}">
-              <a14:hiddenFill xmlns:a14="http://schemas.microsoft.com/office/drawing/2010/main" xmlns="">
+              <a14:hiddenFill xmlns="" xmlns:a14="http://schemas.microsoft.com/office/drawing/2010/main">
                 <a:solidFill>
                   <a:srgbClr val="FFFFFF"/>
                 </a:solidFill>
@@ -9143,7 +9148,7 @@
               </a:ln>
               <a:extLst>
                 <a:ext uri="{91240B29-F687-4f45-9708-019B960494DF}">
-                  <a14:hiddenLine xmlns:a14="http://schemas.microsoft.com/office/drawing/2010/main" xmlns="" w="9525">
+                  <a14:hiddenLine xmlns="" xmlns:a14="http://schemas.microsoft.com/office/drawing/2010/main" w="9525">
                     <a:solidFill>
                       <a:srgbClr val="000000"/>
                     </a:solidFill>
@@ -9233,7 +9238,7 @@
               </a:ln>
               <a:extLst>
                 <a:ext uri="{91240B29-F687-4f45-9708-019B960494DF}">
-                  <a14:hiddenLine xmlns:a14="http://schemas.microsoft.com/office/drawing/2010/main" xmlns="" w="9525">
+                  <a14:hiddenLine xmlns="" xmlns:a14="http://schemas.microsoft.com/office/drawing/2010/main" w="9525">
                     <a:solidFill>
                       <a:srgbClr val="000000"/>
                     </a:solidFill>
@@ -9323,7 +9328,7 @@
               </a:ln>
               <a:extLst>
                 <a:ext uri="{91240B29-F687-4f45-9708-019B960494DF}">
-                  <a14:hiddenLine xmlns:a14="http://schemas.microsoft.com/office/drawing/2010/main" xmlns="" w="9525">
+                  <a14:hiddenLine xmlns="" xmlns:a14="http://schemas.microsoft.com/office/drawing/2010/main" w="9525">
                     <a:solidFill>
                       <a:srgbClr val="000000"/>
                     </a:solidFill>
@@ -9385,7 +9390,7 @@
               </a:ln>
               <a:extLst>
                 <a:ext uri="{91240B29-F687-4f45-9708-019B960494DF}">
-                  <a14:hiddenLine xmlns:a14="http://schemas.microsoft.com/office/drawing/2010/main" xmlns="" w="9525">
+                  <a14:hiddenLine xmlns="" xmlns:a14="http://schemas.microsoft.com/office/drawing/2010/main" w="9525">
                     <a:solidFill>
                       <a:srgbClr val="000000"/>
                     </a:solidFill>
@@ -9475,7 +9480,7 @@
               </a:ln>
               <a:extLst>
                 <a:ext uri="{91240B29-F687-4f45-9708-019B960494DF}">
-                  <a14:hiddenLine xmlns:a14="http://schemas.microsoft.com/office/drawing/2010/main" xmlns="" w="9525">
+                  <a14:hiddenLine xmlns="" xmlns:a14="http://schemas.microsoft.com/office/drawing/2010/main" w="9525">
                     <a:solidFill>
                       <a:srgbClr val="000000"/>
                     </a:solidFill>
@@ -9537,7 +9542,7 @@
               </a:ln>
               <a:extLst>
                 <a:ext uri="{91240B29-F687-4f45-9708-019B960494DF}">
-                  <a14:hiddenLine xmlns:a14="http://schemas.microsoft.com/office/drawing/2010/main" xmlns="" w="9525">
+                  <a14:hiddenLine xmlns="" xmlns:a14="http://schemas.microsoft.com/office/drawing/2010/main" w="9525">
                     <a:solidFill>
                       <a:srgbClr val="000000"/>
                     </a:solidFill>
@@ -9599,7 +9604,7 @@
               </a:ln>
               <a:extLst>
                 <a:ext uri="{91240B29-F687-4f45-9708-019B960494DF}">
-                  <a14:hiddenLine xmlns:a14="http://schemas.microsoft.com/office/drawing/2010/main" xmlns="" w="9525">
+                  <a14:hiddenLine xmlns="" xmlns:a14="http://schemas.microsoft.com/office/drawing/2010/main" w="9525">
                     <a:solidFill>
                       <a:srgbClr val="000000"/>
                     </a:solidFill>
@@ -9689,7 +9694,7 @@
               </a:ln>
               <a:extLst>
                 <a:ext uri="{91240B29-F687-4f45-9708-019B960494DF}">
-                  <a14:hiddenLine xmlns:a14="http://schemas.microsoft.com/office/drawing/2010/main" xmlns="" w="9525">
+                  <a14:hiddenLine xmlns="" xmlns:a14="http://schemas.microsoft.com/office/drawing/2010/main" w="9525">
                     <a:solidFill>
                       <a:srgbClr val="000000"/>
                     </a:solidFill>
@@ -9779,7 +9784,7 @@
               </a:ln>
               <a:extLst>
                 <a:ext uri="{91240B29-F687-4f45-9708-019B960494DF}">
-                  <a14:hiddenLine xmlns:a14="http://schemas.microsoft.com/office/drawing/2010/main" xmlns="" w="9525">
+                  <a14:hiddenLine xmlns="" xmlns:a14="http://schemas.microsoft.com/office/drawing/2010/main" w="9525">
                     <a:solidFill>
                       <a:srgbClr val="000000"/>
                     </a:solidFill>
@@ -9841,7 +9846,7 @@
               </a:ln>
               <a:extLst>
                 <a:ext uri="{91240B29-F687-4f45-9708-019B960494DF}">
-                  <a14:hiddenLine xmlns:a14="http://schemas.microsoft.com/office/drawing/2010/main" xmlns="" w="9525">
+                  <a14:hiddenLine xmlns="" xmlns:a14="http://schemas.microsoft.com/office/drawing/2010/main" w="9525">
                     <a:solidFill>
                       <a:srgbClr val="000000"/>
                     </a:solidFill>
@@ -9951,7 +9956,7 @@
               </a:ln>
               <a:extLst>
                 <a:ext uri="{91240B29-F687-4f45-9708-019B960494DF}">
-                  <a14:hiddenLine xmlns:a14="http://schemas.microsoft.com/office/drawing/2010/main" xmlns="" w="9525">
+                  <a14:hiddenLine xmlns="" xmlns:a14="http://schemas.microsoft.com/office/drawing/2010/main" w="9525">
                     <a:solidFill>
                       <a:srgbClr val="000000"/>
                     </a:solidFill>
@@ -10035,7 +10040,7 @@
               </a:ln>
               <a:extLst>
                 <a:ext uri="{91240B29-F687-4f45-9708-019B960494DF}">
-                  <a14:hiddenLine xmlns:a14="http://schemas.microsoft.com/office/drawing/2010/main" xmlns="" w="9525">
+                  <a14:hiddenLine xmlns="" xmlns:a14="http://schemas.microsoft.com/office/drawing/2010/main" w="9525">
                     <a:solidFill>
                       <a:srgbClr val="000000"/>
                     </a:solidFill>
@@ -10097,7 +10102,7 @@
               </a:ln>
               <a:extLst>
                 <a:ext uri="{91240B29-F687-4f45-9708-019B960494DF}">
-                  <a14:hiddenLine xmlns:a14="http://schemas.microsoft.com/office/drawing/2010/main" xmlns="" w="9525">
+                  <a14:hiddenLine xmlns="" xmlns:a14="http://schemas.microsoft.com/office/drawing/2010/main" w="9525">
                     <a:solidFill>
                       <a:srgbClr val="000000"/>
                     </a:solidFill>
@@ -10159,7 +10164,7 @@
               </a:ln>
               <a:extLst>
                 <a:ext uri="{91240B29-F687-4f45-9708-019B960494DF}">
-                  <a14:hiddenLine xmlns:a14="http://schemas.microsoft.com/office/drawing/2010/main" xmlns="" w="9525">
+                  <a14:hiddenLine xmlns="" xmlns:a14="http://schemas.microsoft.com/office/drawing/2010/main" w="9525">
                     <a:solidFill>
                       <a:srgbClr val="000000"/>
                     </a:solidFill>
@@ -10249,7 +10254,7 @@
               </a:ln>
               <a:extLst>
                 <a:ext uri="{91240B29-F687-4f45-9708-019B960494DF}">
-                  <a14:hiddenLine xmlns:a14="http://schemas.microsoft.com/office/drawing/2010/main" xmlns="" w="9525">
+                  <a14:hiddenLine xmlns="" xmlns:a14="http://schemas.microsoft.com/office/drawing/2010/main" w="9525">
                     <a:solidFill>
                       <a:srgbClr val="000000"/>
                     </a:solidFill>
@@ -10283,7 +10288,7 @@
               </a:ln>
               <a:extLst>
                 <a:ext uri="{91240B29-F687-4f45-9708-019B960494DF}">
-                  <a14:hiddenLine xmlns:a14="http://schemas.microsoft.com/office/drawing/2010/main" xmlns="" w="9525">
+                  <a14:hiddenLine xmlns="" xmlns:a14="http://schemas.microsoft.com/office/drawing/2010/main" w="9525">
                     <a:solidFill>
                       <a:srgbClr val="000000"/>
                     </a:solidFill>
@@ -10348,7 +10353,7 @@
               </a:ln>
               <a:extLst>
                 <a:ext uri="{91240B29-F687-4f45-9708-019B960494DF}">
-                  <a14:hiddenLine xmlns:a14="http://schemas.microsoft.com/office/drawing/2010/main" xmlns="" w="9525">
+                  <a14:hiddenLine xmlns="" xmlns:a14="http://schemas.microsoft.com/office/drawing/2010/main" w="9525">
                     <a:solidFill>
                       <a:srgbClr val="000000"/>
                     </a:solidFill>
@@ -10438,7 +10443,7 @@
               </a:ln>
               <a:extLst>
                 <a:ext uri="{91240B29-F687-4f45-9708-019B960494DF}">
-                  <a14:hiddenLine xmlns:a14="http://schemas.microsoft.com/office/drawing/2010/main" xmlns="" w="9525">
+                  <a14:hiddenLine xmlns="" xmlns:a14="http://schemas.microsoft.com/office/drawing/2010/main" w="9525">
                     <a:solidFill>
                       <a:srgbClr val="000000"/>
                     </a:solidFill>
@@ -10500,7 +10505,7 @@
               </a:ln>
               <a:extLst>
                 <a:ext uri="{91240B29-F687-4f45-9708-019B960494DF}">
-                  <a14:hiddenLine xmlns:a14="http://schemas.microsoft.com/office/drawing/2010/main" xmlns="" w="9525">
+                  <a14:hiddenLine xmlns="" xmlns:a14="http://schemas.microsoft.com/office/drawing/2010/main" w="9525">
                     <a:solidFill>
                       <a:srgbClr val="000000"/>
                     </a:solidFill>
@@ -10590,7 +10595,7 @@
               </a:ln>
               <a:extLst>
                 <a:ext uri="{91240B29-F687-4f45-9708-019B960494DF}">
-                  <a14:hiddenLine xmlns:a14="http://schemas.microsoft.com/office/drawing/2010/main" xmlns="" w="9525">
+                  <a14:hiddenLine xmlns="" xmlns:a14="http://schemas.microsoft.com/office/drawing/2010/main" w="9525">
                     <a:solidFill>
                       <a:srgbClr val="000000"/>
                     </a:solidFill>
@@ -10655,7 +10660,7 @@
               </a:ln>
               <a:extLst>
                 <a:ext uri="{91240B29-F687-4f45-9708-019B960494DF}">
-                  <a14:hiddenLine xmlns:a14="http://schemas.microsoft.com/office/drawing/2010/main" xmlns="" w="9525">
+                  <a14:hiddenLine xmlns="" xmlns:a14="http://schemas.microsoft.com/office/drawing/2010/main" w="9525">
                     <a:solidFill>
                       <a:srgbClr val="000000"/>
                     </a:solidFill>
@@ -10717,7 +10722,7 @@
               </a:ln>
               <a:extLst>
                 <a:ext uri="{91240B29-F687-4f45-9708-019B960494DF}">
-                  <a14:hiddenLine xmlns:a14="http://schemas.microsoft.com/office/drawing/2010/main" xmlns="" w="9525">
+                  <a14:hiddenLine xmlns="" xmlns:a14="http://schemas.microsoft.com/office/drawing/2010/main" w="9525">
                     <a:solidFill>
                       <a:srgbClr val="000000"/>
                     </a:solidFill>
@@ -10807,7 +10812,7 @@
               </a:ln>
               <a:extLst>
                 <a:ext uri="{91240B29-F687-4f45-9708-019B960494DF}">
-                  <a14:hiddenLine xmlns:a14="http://schemas.microsoft.com/office/drawing/2010/main" xmlns="" w="9525">
+                  <a14:hiddenLine xmlns="" xmlns:a14="http://schemas.microsoft.com/office/drawing/2010/main" w="9525">
                     <a:solidFill>
                       <a:srgbClr val="000000"/>
                     </a:solidFill>
@@ -10897,7 +10902,7 @@
               </a:ln>
               <a:extLst>
                 <a:ext uri="{91240B29-F687-4f45-9708-019B960494DF}">
-                  <a14:hiddenLine xmlns:a14="http://schemas.microsoft.com/office/drawing/2010/main" xmlns="" w="9525">
+                  <a14:hiddenLine xmlns="" xmlns:a14="http://schemas.microsoft.com/office/drawing/2010/main" w="9525">
                     <a:solidFill>
                       <a:srgbClr val="000000"/>
                     </a:solidFill>
@@ -10962,7 +10967,7 @@
               </a:ln>
               <a:extLst>
                 <a:ext uri="{91240B29-F687-4f45-9708-019B960494DF}">
-                  <a14:hiddenLine xmlns:a14="http://schemas.microsoft.com/office/drawing/2010/main" xmlns="" w="9525">
+                  <a14:hiddenLine xmlns="" xmlns:a14="http://schemas.microsoft.com/office/drawing/2010/main" w="9525">
                     <a:solidFill>
                       <a:srgbClr val="000000"/>
                     </a:solidFill>
@@ -11082,7 +11087,7 @@
               </a:ln>
               <a:extLst>
                 <a:ext uri="{91240B29-F687-4f45-9708-019B960494DF}">
-                  <a14:hiddenLine xmlns:a14="http://schemas.microsoft.com/office/drawing/2010/main" xmlns="" w="9525">
+                  <a14:hiddenLine xmlns="" xmlns:a14="http://schemas.microsoft.com/office/drawing/2010/main" w="9525">
                     <a:solidFill>
                       <a:srgbClr val="000000"/>
                     </a:solidFill>
@@ -11163,7 +11168,7 @@
               </a:ln>
               <a:extLst>
                 <a:ext uri="{91240B29-F687-4f45-9708-019B960494DF}">
-                  <a14:hiddenLine xmlns:a14="http://schemas.microsoft.com/office/drawing/2010/main" xmlns="" w="9525">
+                  <a14:hiddenLine xmlns="" xmlns:a14="http://schemas.microsoft.com/office/drawing/2010/main" w="9525">
                     <a:solidFill>
                       <a:srgbClr val="000000"/>
                     </a:solidFill>
@@ -11278,7 +11283,7 @@
               </a:ln>
               <a:extLst>
                 <a:ext uri="{91240B29-F687-4f45-9708-019B960494DF}">
-                  <a14:hiddenLine xmlns:a14="http://schemas.microsoft.com/office/drawing/2010/main" xmlns="" w="9525">
+                  <a14:hiddenLine xmlns="" xmlns:a14="http://schemas.microsoft.com/office/drawing/2010/main" w="9525">
                     <a:solidFill>
                       <a:srgbClr val="000000"/>
                     </a:solidFill>
@@ -11368,7 +11373,7 @@
               </a:ln>
               <a:extLst>
                 <a:ext uri="{91240B29-F687-4f45-9708-019B960494DF}">
-                  <a14:hiddenLine xmlns:a14="http://schemas.microsoft.com/office/drawing/2010/main" xmlns="" w="9525">
+                  <a14:hiddenLine xmlns="" xmlns:a14="http://schemas.microsoft.com/office/drawing/2010/main" w="9525">
                     <a:solidFill>
                       <a:srgbClr val="000000"/>
                     </a:solidFill>
@@ -11433,7 +11438,7 @@
               </a:ln>
               <a:extLst>
                 <a:ext uri="{91240B29-F687-4f45-9708-019B960494DF}">
-                  <a14:hiddenLine xmlns:a14="http://schemas.microsoft.com/office/drawing/2010/main" xmlns="" w="9525">
+                  <a14:hiddenLine xmlns="" xmlns:a14="http://schemas.microsoft.com/office/drawing/2010/main" w="9525">
                     <a:solidFill>
                       <a:srgbClr val="000000"/>
                     </a:solidFill>
@@ -11523,7 +11528,7 @@
               </a:ln>
               <a:extLst>
                 <a:ext uri="{91240B29-F687-4f45-9708-019B960494DF}">
-                  <a14:hiddenLine xmlns:a14="http://schemas.microsoft.com/office/drawing/2010/main" xmlns="" w="9525">
+                  <a14:hiddenLine xmlns="" xmlns:a14="http://schemas.microsoft.com/office/drawing/2010/main" w="9525">
                     <a:solidFill>
                       <a:srgbClr val="000000"/>
                     </a:solidFill>
@@ -11591,7 +11596,7 @@
               </a:ln>
               <a:extLst>
                 <a:ext uri="{91240B29-F687-4f45-9708-019B960494DF}">
-                  <a14:hiddenLine xmlns:a14="http://schemas.microsoft.com/office/drawing/2010/main" xmlns="" w="9525">
+                  <a14:hiddenLine xmlns="" xmlns:a14="http://schemas.microsoft.com/office/drawing/2010/main" w="9525">
                     <a:solidFill>
                       <a:srgbClr val="000000"/>
                     </a:solidFill>
@@ -11681,7 +11686,7 @@
               </a:ln>
               <a:extLst>
                 <a:ext uri="{91240B29-F687-4f45-9708-019B960494DF}">
-                  <a14:hiddenLine xmlns:a14="http://schemas.microsoft.com/office/drawing/2010/main" xmlns="" w="9525">
+                  <a14:hiddenLine xmlns="" xmlns:a14="http://schemas.microsoft.com/office/drawing/2010/main" w="9525">
                     <a:solidFill>
                       <a:srgbClr val="000000"/>
                     </a:solidFill>
@@ -11749,7 +11754,7 @@
               </a:ln>
               <a:extLst>
                 <a:ext uri="{91240B29-F687-4f45-9708-019B960494DF}">
-                  <a14:hiddenLine xmlns:a14="http://schemas.microsoft.com/office/drawing/2010/main" xmlns="" w="9525">
+                  <a14:hiddenLine xmlns="" xmlns:a14="http://schemas.microsoft.com/office/drawing/2010/main" w="9525">
                     <a:solidFill>
                       <a:srgbClr val="000000"/>
                     </a:solidFill>
@@ -11839,7 +11844,7 @@
               </a:ln>
               <a:extLst>
                 <a:ext uri="{91240B29-F687-4f45-9708-019B960494DF}">
-                  <a14:hiddenLine xmlns:a14="http://schemas.microsoft.com/office/drawing/2010/main" xmlns="" w="9525">
+                  <a14:hiddenLine xmlns="" xmlns:a14="http://schemas.microsoft.com/office/drawing/2010/main" w="9525">
                     <a:solidFill>
                       <a:srgbClr val="000000"/>
                     </a:solidFill>
@@ -11873,7 +11878,7 @@
               </a:ln>
               <a:extLst>
                 <a:ext uri="{91240B29-F687-4f45-9708-019B960494DF}">
-                  <a14:hiddenLine xmlns:a14="http://schemas.microsoft.com/office/drawing/2010/main" xmlns="" w="9525">
+                  <a14:hiddenLine xmlns="" xmlns:a14="http://schemas.microsoft.com/office/drawing/2010/main" w="9525">
                     <a:solidFill>
                       <a:srgbClr val="000000"/>
                     </a:solidFill>
@@ -12818,12 +12823,28 @@
         </p:nvSpPr>
         <p:spPr/>
         <p:txBody>
-          <a:bodyPr/>
+          <a:bodyPr>
+            <a:normAutofit fontScale="92500" lnSpcReduction="20000"/>
+          </a:bodyPr>
           <a:lstStyle/>
           <a:p>
             <a:r>
               <a:rPr lang="en-US" dirty="0"/>
-              <a:t>Use of Arduino Mega to act as main controller and data acquisition system</a:t>
+              <a:t>Use of (2) Arduino Mega microcontroller boards</a:t>
+            </a:r>
+          </a:p>
+          <a:p>
+            <a:pPr lvl="1"/>
+            <a:r>
+              <a:rPr lang="en-US" dirty="0"/>
+              <a:t>main controller</a:t>
+            </a:r>
+          </a:p>
+          <a:p>
+            <a:pPr lvl="1"/>
+            <a:r>
+              <a:rPr lang="en-US" dirty="0"/>
+              <a:t>data acquisition system</a:t>
             </a:r>
           </a:p>
           <a:p>

</xml_diff>

<commit_message>
final presentation, everything in working order
</commit_message>
<xml_diff>
--- a/lab/Final Presentation.pptx
+++ b/lab/Final Presentation.pptx
@@ -11,7 +11,8 @@
     <p:sldId id="262" r:id="rId5"/>
     <p:sldId id="259" r:id="rId6"/>
     <p:sldId id="260" r:id="rId7"/>
-    <p:sldId id="261" r:id="rId8"/>
+    <p:sldId id="263" r:id="rId8"/>
+    <p:sldId id="264" r:id="rId9"/>
   </p:sldIdLst>
   <p:sldSz cx="12192000" cy="6858000"/>
   <p:notesSz cx="6858000" cy="9144000"/>
@@ -4400,7 +4401,7 @@
           <a:p>
             <a:fld id="{6A7AF7CF-EF0B-419F-9E65-338A2BE2EE02}" type="datetimeFigureOut">
               <a:rPr lang="en-US" smtClean="0"/>
-              <a:t>12/1/2018</a:t>
+              <a:t>12/3/2018</a:t>
             </a:fld>
             <a:endParaRPr lang="en-US"/>
           </a:p>
@@ -4667,7 +4668,7 @@
           <a:p>
             <a:fld id="{6A7AF7CF-EF0B-419F-9E65-338A2BE2EE02}" type="datetimeFigureOut">
               <a:rPr lang="en-US" smtClean="0"/>
-              <a:t>12/1/2018</a:t>
+              <a:t>12/3/2018</a:t>
             </a:fld>
             <a:endParaRPr lang="en-US"/>
           </a:p>
@@ -4863,7 +4864,7 @@
           <a:p>
             <a:fld id="{6A7AF7CF-EF0B-419F-9E65-338A2BE2EE02}" type="datetimeFigureOut">
               <a:rPr lang="en-US" smtClean="0"/>
-              <a:t>12/1/2018</a:t>
+              <a:t>12/3/2018</a:t>
             </a:fld>
             <a:endParaRPr lang="en-US"/>
           </a:p>
@@ -5126,7 +5127,7 @@
           <a:p>
             <a:fld id="{6A7AF7CF-EF0B-419F-9E65-338A2BE2EE02}" type="datetimeFigureOut">
               <a:rPr lang="en-US" smtClean="0"/>
-              <a:t>12/1/2018</a:t>
+              <a:t>12/3/2018</a:t>
             </a:fld>
             <a:endParaRPr lang="en-US"/>
           </a:p>
@@ -5560,7 +5561,7 @@
           <a:p>
             <a:fld id="{6A7AF7CF-EF0B-419F-9E65-338A2BE2EE02}" type="datetimeFigureOut">
               <a:rPr lang="en-US" smtClean="0"/>
-              <a:t>12/1/2018</a:t>
+              <a:t>12/3/2018</a:t>
             </a:fld>
             <a:endParaRPr lang="en-US"/>
           </a:p>
@@ -6106,7 +6107,7 @@
           <a:p>
             <a:fld id="{6A7AF7CF-EF0B-419F-9E65-338A2BE2EE02}" type="datetimeFigureOut">
               <a:rPr lang="en-US" smtClean="0"/>
-              <a:t>12/1/2018</a:t>
+              <a:t>12/3/2018</a:t>
             </a:fld>
             <a:endParaRPr lang="en-US"/>
           </a:p>
@@ -6826,7 +6827,7 @@
           <a:p>
             <a:fld id="{6A7AF7CF-EF0B-419F-9E65-338A2BE2EE02}" type="datetimeFigureOut">
               <a:rPr lang="en-US" smtClean="0"/>
-              <a:t>12/1/2018</a:t>
+              <a:t>12/3/2018</a:t>
             </a:fld>
             <a:endParaRPr lang="en-US"/>
           </a:p>
@@ -6996,7 +6997,7 @@
           <a:p>
             <a:fld id="{6A7AF7CF-EF0B-419F-9E65-338A2BE2EE02}" type="datetimeFigureOut">
               <a:rPr lang="en-US" smtClean="0"/>
-              <a:t>12/1/2018</a:t>
+              <a:t>12/3/2018</a:t>
             </a:fld>
             <a:endParaRPr lang="en-US"/>
           </a:p>
@@ -7176,7 +7177,7 @@
           <a:p>
             <a:fld id="{6A7AF7CF-EF0B-419F-9E65-338A2BE2EE02}" type="datetimeFigureOut">
               <a:rPr lang="en-US" smtClean="0"/>
-              <a:t>12/1/2018</a:t>
+              <a:t>12/3/2018</a:t>
             </a:fld>
             <a:endParaRPr lang="en-US"/>
           </a:p>
@@ -7346,7 +7347,7 @@
           <a:p>
             <a:fld id="{6A7AF7CF-EF0B-419F-9E65-338A2BE2EE02}" type="datetimeFigureOut">
               <a:rPr lang="en-US" smtClean="0"/>
-              <a:t>12/1/2018</a:t>
+              <a:t>12/3/2018</a:t>
             </a:fld>
             <a:endParaRPr lang="en-US"/>
           </a:p>
@@ -7596,7 +7597,7 @@
           <a:p>
             <a:fld id="{6A7AF7CF-EF0B-419F-9E65-338A2BE2EE02}" type="datetimeFigureOut">
               <a:rPr lang="en-US" smtClean="0"/>
-              <a:t>12/1/2018</a:t>
+              <a:t>12/3/2018</a:t>
             </a:fld>
             <a:endParaRPr lang="en-US"/>
           </a:p>
@@ -7828,7 +7829,7 @@
           <a:p>
             <a:fld id="{6A7AF7CF-EF0B-419F-9E65-338A2BE2EE02}" type="datetimeFigureOut">
               <a:rPr lang="en-US" smtClean="0"/>
-              <a:t>12/1/2018</a:t>
+              <a:t>12/3/2018</a:t>
             </a:fld>
             <a:endParaRPr lang="en-US"/>
           </a:p>
@@ -8209,7 +8210,7 @@
           <a:p>
             <a:fld id="{6A7AF7CF-EF0B-419F-9E65-338A2BE2EE02}" type="datetimeFigureOut">
               <a:rPr lang="en-US" smtClean="0"/>
-              <a:t>12/1/2018</a:t>
+              <a:t>12/3/2018</a:t>
             </a:fld>
             <a:endParaRPr lang="en-US"/>
           </a:p>
@@ -8327,7 +8328,7 @@
           <a:p>
             <a:fld id="{6A7AF7CF-EF0B-419F-9E65-338A2BE2EE02}" type="datetimeFigureOut">
               <a:rPr lang="en-US" smtClean="0"/>
-              <a:t>12/1/2018</a:t>
+              <a:t>12/3/2018</a:t>
             </a:fld>
             <a:endParaRPr lang="en-US"/>
           </a:p>
@@ -8422,7 +8423,7 @@
           <a:p>
             <a:fld id="{6A7AF7CF-EF0B-419F-9E65-338A2BE2EE02}" type="datetimeFigureOut">
               <a:rPr lang="en-US" smtClean="0"/>
-              <a:t>12/1/2018</a:t>
+              <a:t>12/3/2018</a:t>
             </a:fld>
             <a:endParaRPr lang="en-US"/>
           </a:p>
@@ -8671,7 +8672,7 @@
           <a:p>
             <a:fld id="{6A7AF7CF-EF0B-419F-9E65-338A2BE2EE02}" type="datetimeFigureOut">
               <a:rPr lang="en-US" smtClean="0"/>
-              <a:t>12/1/2018</a:t>
+              <a:t>12/3/2018</a:t>
             </a:fld>
             <a:endParaRPr lang="en-US"/>
           </a:p>
@@ -8951,7 +8952,7 @@
           <a:p>
             <a:fld id="{6A7AF7CF-EF0B-419F-9E65-338A2BE2EE02}" type="datetimeFigureOut">
               <a:rPr lang="en-US" smtClean="0"/>
-              <a:t>12/1/2018</a:t>
+              <a:t>12/3/2018</a:t>
             </a:fld>
             <a:endParaRPr lang="en-US"/>
           </a:p>
@@ -12018,7 +12019,7 @@
           <a:p>
             <a:fld id="{6A7AF7CF-EF0B-419F-9E65-338A2BE2EE02}" type="datetimeFigureOut">
               <a:rPr lang="en-US" smtClean="0"/>
-              <a:t>12/1/2018</a:t>
+              <a:t>12/3/2018</a:t>
             </a:fld>
             <a:endParaRPr lang="en-US"/>
           </a:p>
@@ -13275,7 +13276,7 @@
           <p:cNvPr id="2" name="Title 1">
             <a:extLst>
               <a:ext uri="{FF2B5EF4-FFF2-40B4-BE49-F238E27FC236}">
-                <a16:creationId xmlns:a16="http://schemas.microsoft.com/office/drawing/2014/main" id="{A9B63241-F340-4663-9FB6-1349E6CE828D}"/>
+                <a16:creationId xmlns:a16="http://schemas.microsoft.com/office/drawing/2014/main" id="{1E6613A9-1CED-46A5-B745-D45CC3EC92F5}"/>
               </a:ext>
             </a:extLst>
           </p:cNvPr>
@@ -13293,7 +13294,7 @@
           <a:p>
             <a:r>
               <a:rPr lang="en-US" dirty="0"/>
-              <a:t>demo</a:t>
+              <a:t>DAQ Circuit board</a:t>
             </a:r>
           </a:p>
         </p:txBody>
@@ -13303,7 +13304,7 @@
           <p:cNvPr id="3" name="Content Placeholder 2">
             <a:extLst>
               <a:ext uri="{FF2B5EF4-FFF2-40B4-BE49-F238E27FC236}">
-                <a16:creationId xmlns:a16="http://schemas.microsoft.com/office/drawing/2014/main" id="{3C958CD2-A47A-4A85-A001-1210F7315C05}"/>
+                <a16:creationId xmlns:a16="http://schemas.microsoft.com/office/drawing/2014/main" id="{D9A57556-A183-429A-A7C0-507F9F457A68}"/>
               </a:ext>
             </a:extLst>
           </p:cNvPr>
@@ -13319,14 +13320,167 @@
           <a:bodyPr/>
           <a:lstStyle/>
           <a:p>
-            <a:endParaRPr lang="en-US" dirty="0"/>
+            <a:endParaRPr lang="en-US"/>
           </a:p>
         </p:txBody>
       </p:sp>
+      <p:pic>
+        <p:nvPicPr>
+          <p:cNvPr id="4" name="Content Placeholder 4">
+            <a:extLst>
+              <a:ext uri="{FF2B5EF4-FFF2-40B4-BE49-F238E27FC236}">
+                <a16:creationId xmlns:a16="http://schemas.microsoft.com/office/drawing/2014/main" id="{25E1DF64-E97F-456B-BAB4-76ED80C18295}"/>
+              </a:ext>
+            </a:extLst>
+          </p:cNvPr>
+          <p:cNvPicPr>
+            <a:picLocks noChangeAspect="1"/>
+          </p:cNvPicPr>
+          <p:nvPr/>
+        </p:nvPicPr>
+        <p:blipFill rotWithShape="1">
+          <a:blip r:embed="rId2">
+            <a:extLst>
+              <a:ext uri="{28A0092B-C50C-407E-A947-70E740481C1C}">
+                <a14:useLocalDpi xmlns:a14="http://schemas.microsoft.com/office/drawing/2010/main" val="0"/>
+              </a:ext>
+            </a:extLst>
+          </a:blip>
+          <a:srcRect l="29081" t="23997" r="23851" b="23686"/>
+          <a:stretch/>
+        </p:blipFill>
+        <p:spPr>
+          <a:xfrm>
+            <a:off x="3970189" y="2401885"/>
+            <a:ext cx="4248443" cy="3541715"/>
+          </a:xfrm>
+          <a:prstGeom prst="rect">
+            <a:avLst/>
+          </a:prstGeom>
+        </p:spPr>
+      </p:pic>
     </p:spTree>
     <p:extLst>
       <p:ext uri="{BB962C8B-B14F-4D97-AF65-F5344CB8AC3E}">
-        <p14:creationId xmlns:p14="http://schemas.microsoft.com/office/powerpoint/2010/main" val="498559396"/>
+        <p14:creationId xmlns:p14="http://schemas.microsoft.com/office/powerpoint/2010/main" val="1368128713"/>
+      </p:ext>
+    </p:extLst>
+  </p:cSld>
+  <p:clrMapOvr>
+    <a:masterClrMapping/>
+  </p:clrMapOvr>
+</p:sld>
+</file>
+
+<file path=ppt/slides/slide8.xml><?xml version="1.0" encoding="utf-8"?>
+<p:sld xmlns:a="http://schemas.openxmlformats.org/drawingml/2006/main" xmlns:r="http://schemas.openxmlformats.org/officeDocument/2006/relationships" xmlns:p="http://schemas.openxmlformats.org/presentationml/2006/main">
+  <p:cSld>
+    <p:spTree>
+      <p:nvGrpSpPr>
+        <p:cNvPr id="1" name=""/>
+        <p:cNvGrpSpPr/>
+        <p:nvPr/>
+      </p:nvGrpSpPr>
+      <p:grpSpPr>
+        <a:xfrm>
+          <a:off x="0" y="0"/>
+          <a:ext cx="0" cy="0"/>
+          <a:chOff x="0" y="0"/>
+          <a:chExt cx="0" cy="0"/>
+        </a:xfrm>
+      </p:grpSpPr>
+      <p:sp>
+        <p:nvSpPr>
+          <p:cNvPr id="2" name="Title 1">
+            <a:extLst>
+              <a:ext uri="{FF2B5EF4-FFF2-40B4-BE49-F238E27FC236}">
+                <a16:creationId xmlns:a16="http://schemas.microsoft.com/office/drawing/2014/main" id="{4C77D6D3-D011-4057-A53B-0E9DE60F8FD5}"/>
+              </a:ext>
+            </a:extLst>
+          </p:cNvPr>
+          <p:cNvSpPr>
+            <a:spLocks noGrp="1"/>
+          </p:cNvSpPr>
+          <p:nvPr>
+            <p:ph type="title"/>
+          </p:nvPr>
+        </p:nvSpPr>
+        <p:spPr/>
+        <p:txBody>
+          <a:bodyPr/>
+          <a:lstStyle/>
+          <a:p>
+            <a:r>
+              <a:rPr lang="en-US" dirty="0"/>
+              <a:t>Main controller circuit board</a:t>
+            </a:r>
+          </a:p>
+        </p:txBody>
+      </p:sp>
+      <p:sp>
+        <p:nvSpPr>
+          <p:cNvPr id="8" name="Content Placeholder 7">
+            <a:extLst>
+              <a:ext uri="{FF2B5EF4-FFF2-40B4-BE49-F238E27FC236}">
+                <a16:creationId xmlns:a16="http://schemas.microsoft.com/office/drawing/2014/main" id="{22CB94C4-DEE1-478B-9C5C-E2B14F9C6332}"/>
+              </a:ext>
+            </a:extLst>
+          </p:cNvPr>
+          <p:cNvSpPr>
+            <a:spLocks noGrp="1"/>
+          </p:cNvSpPr>
+          <p:nvPr>
+            <p:ph idx="1"/>
+          </p:nvPr>
+        </p:nvSpPr>
+        <p:spPr/>
+        <p:txBody>
+          <a:bodyPr/>
+          <a:lstStyle/>
+          <a:p>
+            <a:endParaRPr lang="en-US"/>
+          </a:p>
+        </p:txBody>
+      </p:sp>
+      <p:pic>
+        <p:nvPicPr>
+          <p:cNvPr id="7" name="Picture 6" descr="A circuit board&#10;&#10;Description generated with very high confidence">
+            <a:extLst>
+              <a:ext uri="{FF2B5EF4-FFF2-40B4-BE49-F238E27FC236}">
+                <a16:creationId xmlns:a16="http://schemas.microsoft.com/office/drawing/2014/main" id="{339CFD35-FF82-4AC9-8C9A-52B85EEFE8EC}"/>
+              </a:ext>
+            </a:extLst>
+          </p:cNvPr>
+          <p:cNvPicPr>
+            <a:picLocks noChangeAspect="1"/>
+          </p:cNvPicPr>
+          <p:nvPr/>
+        </p:nvPicPr>
+        <p:blipFill rotWithShape="1">
+          <a:blip r:embed="rId2">
+            <a:extLst>
+              <a:ext uri="{28A0092B-C50C-407E-A947-70E740481C1C}">
+                <a14:useLocalDpi xmlns:a14="http://schemas.microsoft.com/office/drawing/2010/main" val="0"/>
+              </a:ext>
+            </a:extLst>
+          </a:blip>
+          <a:srcRect l="31180" t="32000" r="4205" b="15173"/>
+          <a:stretch/>
+        </p:blipFill>
+        <p:spPr>
+          <a:xfrm>
+            <a:off x="3140195" y="2320709"/>
+            <a:ext cx="5908432" cy="3622891"/>
+          </a:xfrm>
+          <a:prstGeom prst="rect">
+            <a:avLst/>
+          </a:prstGeom>
+        </p:spPr>
+      </p:pic>
+    </p:spTree>
+    <p:extLst>
+      <p:ext uri="{BB962C8B-B14F-4D97-AF65-F5344CB8AC3E}">
+        <p14:creationId xmlns:p14="http://schemas.microsoft.com/office/powerpoint/2010/main" val="246626981"/>
       </p:ext>
     </p:extLst>
   </p:cSld>

</xml_diff>